<commit_message>
Cresting Nodes - TimeTable
</commit_message>
<xml_diff>
--- a/DesignProject.pptx
+++ b/DesignProject.pptx
@@ -3967,13 +3967,13 @@
         </p:nvSpPr>
         <p:spPr>
           <a:xfrm>
-            <a:off x="2008331" y="3836126"/>
-            <a:ext cx="1823186" cy="812074"/>
+            <a:off x="1435510" y="3836125"/>
+            <a:ext cx="2396007" cy="1365139"/>
           </a:xfrm>
           <a:prstGeom prst="wedgeRoundRectCallout">
             <a:avLst>
-              <a:gd name="adj1" fmla="val 162113"/>
-              <a:gd name="adj2" fmla="val -103138"/>
+              <a:gd name="adj1" fmla="val 134771"/>
+              <a:gd name="adj2" fmla="val -71447"/>
               <a:gd name="adj3" fmla="val 16667"/>
             </a:avLst>
           </a:prstGeom>
@@ -4043,6 +4043,32 @@
           </a:p>
           <a:p>
             <a:r>
+              <a:rPr lang="en-US" sz="1000" dirty="0">
+                <a:solidFill>
+                  <a:schemeClr val="tx1"/>
+                </a:solidFill>
+              </a:rPr>
+              <a:t>{</a:t>
+            </a:r>
+            <a:r>
+              <a:rPr lang="en-US" sz="1000" b="1" dirty="0">
+                <a:solidFill>
+                  <a:schemeClr val="tx1"/>
+                </a:solidFill>
+              </a:rPr>
+              <a:t>course</a:t>
+            </a:r>
+            <a:r>
+              <a:rPr lang="en-US" sz="1000" dirty="0">
+                <a:solidFill>
+                  <a:schemeClr val="tx1"/>
+                </a:solidFill>
+              </a:rPr>
+              <a:t>: BSc in Software Development}</a:t>
+            </a:r>
+          </a:p>
+          <a:p>
+            <a:r>
               <a:rPr lang="en-US" sz="1000" dirty="0" smtClean="0">
                 <a:solidFill>
                   <a:schemeClr val="tx1"/>
@@ -4056,7 +4082,7 @@
                   <a:schemeClr val="tx1"/>
                 </a:solidFill>
               </a:rPr>
-              <a:t>course</a:t>
+              <a:t>Campus</a:t>
             </a:r>
             <a:r>
               <a:rPr lang="en-US" sz="1000" dirty="0" smtClean="0">
@@ -4064,33 +4090,7 @@
                   <a:schemeClr val="tx1"/>
                 </a:solidFill>
               </a:rPr>
-              <a:t>: name}</a:t>
-            </a:r>
-          </a:p>
-          <a:p>
-            <a:r>
-              <a:rPr lang="en-US" sz="1000" dirty="0" smtClean="0">
-                <a:solidFill>
-                  <a:schemeClr val="tx1"/>
-                </a:solidFill>
-              </a:rPr>
-              <a:t>{</a:t>
-            </a:r>
-            <a:r>
-              <a:rPr lang="en-US" sz="1000" b="1" dirty="0" smtClean="0">
-                <a:solidFill>
-                  <a:schemeClr val="tx1"/>
-                </a:solidFill>
-              </a:rPr>
-              <a:t>Year</a:t>
-            </a:r>
-            <a:r>
-              <a:rPr lang="en-US" sz="1000" dirty="0" smtClean="0">
-                <a:solidFill>
-                  <a:schemeClr val="tx1"/>
-                </a:solidFill>
-              </a:rPr>
-              <a:t>: 2017}</a:t>
+              <a:t>: Galway}</a:t>
             </a:r>
             <a:endParaRPr lang="en-US" sz="1000" dirty="0" smtClean="0">
               <a:solidFill>
@@ -4113,6 +4113,53 @@
                   <a:schemeClr val="tx1"/>
                 </a:solidFill>
               </a:rPr>
+              <a:t>Year</a:t>
+            </a:r>
+            <a:r>
+              <a:rPr lang="en-US" sz="1000" dirty="0" smtClean="0">
+                <a:solidFill>
+                  <a:schemeClr val="tx1"/>
+                </a:solidFill>
+              </a:rPr>
+              <a:t>: </a:t>
+            </a:r>
+            <a:r>
+              <a:rPr lang="en-US" sz="1000" dirty="0">
+                <a:solidFill>
+                  <a:schemeClr val="tx1"/>
+                </a:solidFill>
+              </a:rPr>
+              <a:t>3</a:t>
+            </a:r>
+            <a:r>
+              <a:rPr lang="en-US" sz="1000" dirty="0" smtClean="0">
+                <a:solidFill>
+                  <a:schemeClr val="tx1"/>
+                </a:solidFill>
+              </a:rPr>
+              <a:t>}</a:t>
+            </a:r>
+            <a:endParaRPr lang="en-US" sz="1000" dirty="0" smtClean="0">
+              <a:solidFill>
+                <a:schemeClr val="tx1"/>
+              </a:solidFill>
+            </a:endParaRPr>
+          </a:p>
+          <a:p>
+            <a:r>
+              <a:rPr lang="en-US" sz="1000" dirty="0" smtClean="0">
+                <a:solidFill>
+                  <a:schemeClr val="tx1"/>
+                </a:solidFill>
+              </a:rPr>
+              <a:t>{</a:t>
+            </a:r>
+            <a:r>
+              <a:rPr lang="en-US" sz="1000" b="1" dirty="0" smtClean="0">
+                <a:solidFill>
+                  <a:schemeClr val="tx1"/>
+                </a:solidFill>
+              </a:rPr>
               <a:t>semester</a:t>
             </a:r>
             <a:r>
@@ -4121,7 +4168,41 @@
                   <a:schemeClr val="tx1"/>
                 </a:solidFill>
               </a:rPr>
-              <a:t>: semester number}</a:t>
+              <a:t>: </a:t>
+            </a:r>
+            <a:r>
+              <a:rPr lang="en-US" sz="1000" dirty="0" smtClean="0">
+                <a:solidFill>
+                  <a:schemeClr val="tx1"/>
+                </a:solidFill>
+              </a:rPr>
+              <a:t>6}</a:t>
+            </a:r>
+          </a:p>
+          <a:p>
+            <a:r>
+              <a:rPr lang="en-US" sz="1000" dirty="0" smtClean="0">
+                <a:solidFill>
+                  <a:schemeClr val="tx1"/>
+                </a:solidFill>
+              </a:rPr>
+              <a:t>{</a:t>
+            </a:r>
+            <a:r>
+              <a:rPr lang="en-US" sz="1000" b="1" dirty="0" smtClean="0">
+                <a:solidFill>
+                  <a:schemeClr val="tx1"/>
+                </a:solidFill>
+              </a:rPr>
+              <a:t>Academic Year: </a:t>
+            </a:r>
+            <a:r>
+              <a:rPr lang="en-US" sz="1000" dirty="0" smtClean="0">
+                <a:solidFill>
+                  <a:schemeClr val="tx1"/>
+                </a:solidFill>
+              </a:rPr>
+              <a:t>2016/2017}</a:t>
             </a:r>
             <a:endParaRPr lang="en-US" sz="1000" dirty="0">
               <a:solidFill>
@@ -4537,7 +4618,7 @@
                   <a:schemeClr val="tx1"/>
                 </a:solidFill>
               </a:rPr>
-              <a:t>: group </a:t>
+              <a:t>: </a:t>
             </a:r>
             <a:r>
               <a:rPr lang="en-US" sz="1000" dirty="0" smtClean="0">
@@ -4545,8 +4626,13 @@
                   <a:schemeClr val="tx1"/>
                 </a:solidFill>
               </a:rPr>
-              <a:t>Letter (C)}</a:t>
-            </a:r>
+              <a:t>C}</a:t>
+            </a:r>
+            <a:endParaRPr lang="en-US" sz="1000" dirty="0" smtClean="0">
+              <a:solidFill>
+                <a:schemeClr val="tx1"/>
+              </a:solidFill>
+            </a:endParaRPr>
           </a:p>
           <a:p>
             <a:r>
@@ -4678,7 +4764,7 @@
                   <a:schemeClr val="tx1"/>
                 </a:solidFill>
               </a:rPr>
-              <a:t>: time </a:t>
+              <a:t>: </a:t>
             </a:r>
             <a:r>
               <a:rPr lang="en-US" sz="1000" dirty="0" smtClean="0">
@@ -4686,7 +4772,23 @@
                   <a:schemeClr val="tx1"/>
                 </a:solidFill>
               </a:rPr>
-              <a:t>slot (13:00 to 12:00))</a:t>
+              <a:t>13:00 </a:t>
+            </a:r>
+            <a:r>
+              <a:rPr lang="en-US" sz="1000" dirty="0" smtClean="0">
+                <a:solidFill>
+                  <a:schemeClr val="tx1"/>
+                </a:solidFill>
+              </a:rPr>
+              <a:t>to </a:t>
+            </a:r>
+            <a:r>
+              <a:rPr lang="en-US" sz="1000" dirty="0" smtClean="0">
+                <a:solidFill>
+                  <a:schemeClr val="tx1"/>
+                </a:solidFill>
+              </a:rPr>
+              <a:t>12:00)</a:t>
             </a:r>
             <a:endParaRPr lang="en-US" sz="1000" dirty="0">
               <a:solidFill>
@@ -4984,15 +5086,7 @@
                   <a:schemeClr val="tx1"/>
                 </a:solidFill>
               </a:rPr>
-              <a:t>: lecturer name</a:t>
-            </a:r>
-            <a:r>
-              <a:rPr lang="en-US" sz="1000" dirty="0" smtClean="0">
-                <a:solidFill>
-                  <a:schemeClr val="tx1"/>
-                </a:solidFill>
-              </a:rPr>
-              <a:t>}</a:t>
+              <a:t>: lecturer name}</a:t>
             </a:r>
             <a:endParaRPr lang="en-US" sz="1000" dirty="0">
               <a:solidFill>

</xml_diff>

<commit_message>
Creating Nodes Room, Time table, Timer Slot
</commit_message>
<xml_diff>
--- a/DesignProject.pptx
+++ b/DesignProject.pptx
@@ -4927,13 +4927,13 @@
         <p:nvCxnSpPr>
           <p:cNvPr id="27" name="Straight Arrow Connector 26"/>
           <p:cNvCxnSpPr>
-            <a:stCxn id="26" idx="2"/>
-            <a:endCxn id="5" idx="7"/>
+            <a:stCxn id="5" idx="7"/>
+            <a:endCxn id="26" idx="2"/>
           </p:cNvCxnSpPr>
           <p:nvPr/>
         </p:nvCxnSpPr>
         <p:spPr>
-          <a:xfrm flipH="1">
+          <a:xfrm flipV="1">
             <a:off x="4474640" y="1330728"/>
             <a:ext cx="1045530" cy="536080"/>
           </a:xfrm>

</xml_diff>

<commit_message>
Relates nodes and update the design
</commit_message>
<xml_diff>
--- a/DesignProject.pptx
+++ b/DesignProject.pptx
@@ -3507,7 +3507,7 @@
         </p:nvSpPr>
         <p:spPr>
           <a:xfrm>
-            <a:off x="5884761" y="2950730"/>
+            <a:off x="4517280" y="3460511"/>
             <a:ext cx="940904" cy="940904"/>
           </a:xfrm>
           <a:prstGeom prst="ellipse">
@@ -3572,7 +3572,7 @@
         </p:nvSpPr>
         <p:spPr>
           <a:xfrm>
-            <a:off x="3671528" y="1729016"/>
+            <a:off x="5705715" y="1800540"/>
             <a:ext cx="940904" cy="940904"/>
           </a:xfrm>
           <a:prstGeom prst="ellipse">
@@ -3636,8 +3636,8 @@
           <p:nvPr/>
         </p:nvSpPr>
         <p:spPr>
-          <a:xfrm rot="1207530">
-            <a:off x="4868780" y="2522290"/>
+          <a:xfrm rot="2321980">
+            <a:off x="6712991" y="2751167"/>
             <a:ext cx="982898" cy="369332"/>
           </a:xfrm>
           <a:prstGeom prst="rect">
@@ -3663,15 +3663,14 @@
         <p:nvCxnSpPr>
           <p:cNvPr id="16" name="Straight Arrow Connector 15"/>
           <p:cNvCxnSpPr>
-            <a:stCxn id="5" idx="5"/>
-            <a:endCxn id="4" idx="1"/>
+            <a:endCxn id="34" idx="1"/>
           </p:cNvCxnSpPr>
           <p:nvPr/>
         </p:nvCxnSpPr>
         <p:spPr>
           <a:xfrm>
-            <a:off x="4474640" y="2532128"/>
-            <a:ext cx="1547913" cy="556394"/>
+            <a:off x="6549342" y="2603652"/>
+            <a:ext cx="1215289" cy="994651"/>
           </a:xfrm>
           <a:prstGeom prst="straightConnector1">
             <a:avLst/>
@@ -3703,7 +3702,7 @@
         </p:nvSpPr>
         <p:spPr>
           <a:xfrm>
-            <a:off x="7308912" y="1258564"/>
+            <a:off x="7177244" y="1164673"/>
             <a:ext cx="940904" cy="940904"/>
           </a:xfrm>
           <a:prstGeom prst="ellipse">
@@ -3764,15 +3763,15 @@
         <p:nvCxnSpPr>
           <p:cNvPr id="22" name="Straight Arrow Connector 21"/>
           <p:cNvCxnSpPr>
-            <a:stCxn id="18" idx="3"/>
-            <a:endCxn id="4" idx="7"/>
+            <a:stCxn id="18" idx="4"/>
+            <a:endCxn id="34" idx="0"/>
           </p:cNvCxnSpPr>
           <p:nvPr/>
         </p:nvCxnSpPr>
         <p:spPr>
-          <a:xfrm flipH="1">
-            <a:off x="6687873" y="2061676"/>
-            <a:ext cx="758831" cy="1026846"/>
+          <a:xfrm>
+            <a:off x="7647696" y="2105577"/>
+            <a:ext cx="449595" cy="1354934"/>
           </a:xfrm>
           <a:prstGeom prst="straightConnector1">
             <a:avLst/>
@@ -3803,8 +3802,8 @@
           <p:nvPr/>
         </p:nvSpPr>
         <p:spPr>
-          <a:xfrm rot="18316285">
-            <a:off x="6601702" y="2281790"/>
+          <a:xfrm rot="4318783">
+            <a:off x="7602106" y="2528297"/>
             <a:ext cx="809389" cy="369332"/>
           </a:xfrm>
           <a:prstGeom prst="rect">
@@ -3834,7 +3833,7 @@
         </p:nvSpPr>
         <p:spPr>
           <a:xfrm>
-            <a:off x="8759584" y="1612228"/>
+            <a:off x="8627916" y="1518337"/>
             <a:ext cx="1649880" cy="587240"/>
           </a:xfrm>
           <a:prstGeom prst="wedgeRoundRectCallout">
@@ -3967,13 +3966,13 @@
         </p:nvSpPr>
         <p:spPr>
           <a:xfrm>
-            <a:off x="1435510" y="3836125"/>
+            <a:off x="1748098" y="3460511"/>
             <a:ext cx="2396007" cy="1365139"/>
           </a:xfrm>
           <a:prstGeom prst="wedgeRoundRectCallout">
             <a:avLst>
-              <a:gd name="adj1" fmla="val 134771"/>
-              <a:gd name="adj2" fmla="val -71447"/>
+              <a:gd name="adj1" fmla="val 63369"/>
+              <a:gd name="adj2" fmla="val -23191"/>
               <a:gd name="adj3" fmla="val 16667"/>
             </a:avLst>
           </a:prstGeom>
@@ -4077,12 +4076,20 @@
               <a:t>{</a:t>
             </a:r>
             <a:r>
+              <a:rPr lang="en-US" sz="1000" b="1" dirty="0">
+                <a:solidFill>
+                  <a:schemeClr val="tx1"/>
+                </a:solidFill>
+              </a:rPr>
+              <a:t>c</a:t>
+            </a:r>
+            <a:r>
               <a:rPr lang="en-US" sz="1000" b="1" dirty="0" smtClean="0">
                 <a:solidFill>
                   <a:schemeClr val="tx1"/>
                 </a:solidFill>
               </a:rPr>
-              <a:t>Campus</a:t>
+              <a:t>ampus</a:t>
             </a:r>
             <a:r>
               <a:rPr lang="en-US" sz="1000" dirty="0" smtClean="0">
@@ -4108,12 +4115,20 @@
               <a:t>{</a:t>
             </a:r>
             <a:r>
+              <a:rPr lang="en-US" sz="1000" b="1" dirty="0">
+                <a:solidFill>
+                  <a:schemeClr val="tx1"/>
+                </a:solidFill>
+              </a:rPr>
+              <a:t>y</a:t>
+            </a:r>
+            <a:r>
               <a:rPr lang="en-US" sz="1000" b="1" dirty="0" smtClean="0">
                 <a:solidFill>
                   <a:schemeClr val="tx1"/>
                 </a:solidFill>
               </a:rPr>
-              <a:t>Year</a:t>
+              <a:t>ear</a:t>
             </a:r>
             <a:r>
               <a:rPr lang="en-US" sz="1000" dirty="0" smtClean="0">
@@ -4189,12 +4204,20 @@
               <a:t>{</a:t>
             </a:r>
             <a:r>
+              <a:rPr lang="en-US" sz="1000" b="1" dirty="0">
+                <a:solidFill>
+                  <a:schemeClr val="tx1"/>
+                </a:solidFill>
+              </a:rPr>
+              <a:t>a</a:t>
+            </a:r>
+            <a:r>
               <a:rPr lang="en-US" sz="1000" b="1" dirty="0" smtClean="0">
                 <a:solidFill>
                   <a:schemeClr val="tx1"/>
                 </a:solidFill>
               </a:rPr>
-              <a:t>Academic Year: </a:t>
+              <a:t>cademic Year: </a:t>
             </a:r>
             <a:r>
               <a:rPr lang="en-US" sz="1000" dirty="0" smtClean="0">
@@ -4220,7 +4243,7 @@
         </p:nvSpPr>
         <p:spPr>
           <a:xfrm>
-            <a:off x="5877273" y="4940991"/>
+            <a:off x="7065896" y="4969246"/>
             <a:ext cx="940904" cy="940904"/>
           </a:xfrm>
           <a:prstGeom prst="ellipse">
@@ -4285,14 +4308,14 @@
         </p:nvSpPr>
         <p:spPr>
           <a:xfrm>
-            <a:off x="8590400" y="3421182"/>
+            <a:off x="7626839" y="3460511"/>
             <a:ext cx="940904" cy="940904"/>
           </a:xfrm>
           <a:prstGeom prst="ellipse">
             <a:avLst/>
           </a:prstGeom>
           <a:solidFill>
-            <a:schemeClr val="accent2">
+            <a:schemeClr val="accent6">
               <a:lumMod val="60000"/>
               <a:lumOff val="40000"/>
             </a:schemeClr>
@@ -4350,7 +4373,7 @@
         </p:nvSpPr>
         <p:spPr>
           <a:xfrm>
-            <a:off x="1582514" y="1780822"/>
+            <a:off x="3592985" y="2016964"/>
             <a:ext cx="1663787" cy="470452"/>
           </a:xfrm>
           <a:prstGeom prst="wedgeRoundRectCallout">
@@ -4453,15 +4476,14 @@
         <p:nvCxnSpPr>
           <p:cNvPr id="43" name="Straight Arrow Connector 42"/>
           <p:cNvCxnSpPr>
-            <a:stCxn id="33" idx="0"/>
-            <a:endCxn id="4" idx="4"/>
+            <a:endCxn id="34" idx="4"/>
           </p:cNvCxnSpPr>
           <p:nvPr/>
         </p:nvCxnSpPr>
         <p:spPr>
           <a:xfrm flipV="1">
-            <a:off x="6347725" y="3891634"/>
-            <a:ext cx="7488" cy="1049357"/>
+            <a:off x="7647696" y="4401415"/>
+            <a:ext cx="449595" cy="561607"/>
           </a:xfrm>
           <a:prstGeom prst="straightConnector1">
             <a:avLst/>
@@ -4495,9 +4517,9 @@
           <p:nvPr/>
         </p:nvCxnSpPr>
         <p:spPr>
-          <a:xfrm flipH="1" flipV="1">
-            <a:off x="6825665" y="3421182"/>
-            <a:ext cx="1764735" cy="470452"/>
+          <a:xfrm flipH="1">
+            <a:off x="5458184" y="3930963"/>
+            <a:ext cx="2168655" cy="0"/>
           </a:xfrm>
           <a:prstGeom prst="straightConnector1">
             <a:avLst/>
@@ -4529,13 +4551,13 @@
         </p:nvSpPr>
         <p:spPr>
           <a:xfrm>
-            <a:off x="7146495" y="4940990"/>
+            <a:off x="8627916" y="4963022"/>
             <a:ext cx="1724925" cy="642809"/>
           </a:xfrm>
           <a:prstGeom prst="wedgeRoundRectCallout">
             <a:avLst>
-              <a:gd name="adj1" fmla="val -68755"/>
-              <a:gd name="adj2" fmla="val 34572"/>
+              <a:gd name="adj1" fmla="val -84715"/>
+              <a:gd name="adj2" fmla="val 5509"/>
               <a:gd name="adj3" fmla="val 16667"/>
             </a:avLst>
           </a:prstGeom>
@@ -4610,7 +4632,7 @@
                   <a:schemeClr val="tx1"/>
                 </a:solidFill>
               </a:rPr>
-              <a:t>name</a:t>
+              <a:t>group</a:t>
             </a:r>
             <a:r>
               <a:rPr lang="en-US" sz="1000" dirty="0" smtClean="0">
@@ -4618,15 +4640,7 @@
                   <a:schemeClr val="tx1"/>
                 </a:solidFill>
               </a:rPr>
-              <a:t>: </a:t>
-            </a:r>
-            <a:r>
-              <a:rPr lang="en-US" sz="1000" dirty="0" smtClean="0">
-                <a:solidFill>
-                  <a:schemeClr val="tx1"/>
-                </a:solidFill>
-              </a:rPr>
-              <a:t>C}</a:t>
+              <a:t>: C}</a:t>
             </a:r>
             <a:endParaRPr lang="en-US" sz="1000" dirty="0" smtClean="0">
               <a:solidFill>
@@ -4644,12 +4658,28 @@
               <a:t>{</a:t>
             </a:r>
             <a:r>
+              <a:rPr lang="en-US" sz="1000" b="1" dirty="0">
+                <a:solidFill>
+                  <a:schemeClr val="tx1"/>
+                </a:solidFill>
+              </a:rPr>
+              <a:t>t</a:t>
+            </a:r>
+            <a:r>
               <a:rPr lang="en-US" sz="1000" b="1" dirty="0" smtClean="0">
                 <a:solidFill>
                   <a:schemeClr val="tx1"/>
                 </a:solidFill>
               </a:rPr>
-              <a:t>Total Students: </a:t>
+              <a:t>otalStudents</a:t>
+            </a:r>
+            <a:r>
+              <a:rPr lang="en-US" sz="1000" b="1" dirty="0" smtClean="0">
+                <a:solidFill>
+                  <a:schemeClr val="tx1"/>
+                </a:solidFill>
+              </a:rPr>
+              <a:t>: </a:t>
             </a:r>
             <a:r>
               <a:rPr lang="en-US" sz="1000" dirty="0" smtClean="0">
@@ -4675,8 +4705,8 @@
         </p:nvSpPr>
         <p:spPr>
           <a:xfrm>
-            <a:off x="9741615" y="2950730"/>
-            <a:ext cx="2024875" cy="470452"/>
+            <a:off x="8842128" y="2935833"/>
+            <a:ext cx="2024875" cy="608244"/>
           </a:xfrm>
           <a:prstGeom prst="wedgeRoundRectCallout">
             <a:avLst>
@@ -4738,8 +4768,47 @@
                   <a:schemeClr val="tx1"/>
                 </a:solidFill>
               </a:rPr>
-              <a:t>: 001}</a:t>
-            </a:r>
+              <a:t>: 001</a:t>
+            </a:r>
+            <a:r>
+              <a:rPr lang="en-US" sz="1000" dirty="0" smtClean="0">
+                <a:solidFill>
+                  <a:schemeClr val="tx1"/>
+                </a:solidFill>
+              </a:rPr>
+              <a:t>}</a:t>
+            </a:r>
+          </a:p>
+          <a:p>
+            <a:r>
+              <a:rPr lang="en-US" sz="1000" dirty="0" smtClean="0">
+                <a:solidFill>
+                  <a:schemeClr val="tx1"/>
+                </a:solidFill>
+              </a:rPr>
+              <a:t>{</a:t>
+            </a:r>
+            <a:r>
+              <a:rPr lang="en-US" sz="1000" b="1" dirty="0" smtClean="0">
+                <a:solidFill>
+                  <a:schemeClr val="tx1"/>
+                </a:solidFill>
+              </a:rPr>
+              <a:t>weekName</a:t>
+            </a:r>
+            <a:r>
+              <a:rPr lang="en-US" sz="1000" dirty="0" smtClean="0">
+                <a:solidFill>
+                  <a:schemeClr val="tx1"/>
+                </a:solidFill>
+              </a:rPr>
+              <a:t>: Monday}</a:t>
+            </a:r>
+            <a:endParaRPr lang="en-US" sz="1000" dirty="0" smtClean="0">
+              <a:solidFill>
+                <a:schemeClr val="tx1"/>
+              </a:solidFill>
+            </a:endParaRPr>
           </a:p>
           <a:p>
             <a:r>
@@ -4805,8 +4874,8 @@
           <p:nvPr/>
         </p:nvSpPr>
         <p:spPr>
-          <a:xfrm rot="717573">
-            <a:off x="7427743" y="3384510"/>
+          <a:xfrm>
+            <a:off x="6144802" y="3598303"/>
             <a:ext cx="788999" cy="369332"/>
           </a:xfrm>
           <a:prstGeom prst="rect">
@@ -4835,8 +4904,8 @@
           <p:nvPr/>
         </p:nvSpPr>
         <p:spPr>
-          <a:xfrm rot="16200000">
-            <a:off x="5784381" y="4231645"/>
+          <a:xfrm rot="18488588">
+            <a:off x="7267491" y="4451975"/>
             <a:ext cx="871905" cy="369332"/>
           </a:xfrm>
           <a:prstGeom prst="rect">
@@ -4866,7 +4935,7 @@
         </p:nvSpPr>
         <p:spPr>
           <a:xfrm>
-            <a:off x="5520170" y="860276"/>
+            <a:off x="4284488" y="426615"/>
             <a:ext cx="940904" cy="940904"/>
           </a:xfrm>
           <a:prstGeom prst="ellipse">
@@ -4927,15 +4996,15 @@
         <p:nvCxnSpPr>
           <p:cNvPr id="27" name="Straight Arrow Connector 26"/>
           <p:cNvCxnSpPr>
-            <a:stCxn id="5" idx="7"/>
-            <a:endCxn id="26" idx="2"/>
+            <a:stCxn id="5" idx="1"/>
+            <a:endCxn id="26" idx="5"/>
           </p:cNvCxnSpPr>
           <p:nvPr/>
         </p:nvCxnSpPr>
         <p:spPr>
-          <a:xfrm flipV="1">
-            <a:off x="4474640" y="1330728"/>
-            <a:ext cx="1045530" cy="536080"/>
+          <a:xfrm flipH="1" flipV="1">
+            <a:off x="5087600" y="1229727"/>
+            <a:ext cx="755907" cy="708605"/>
           </a:xfrm>
           <a:prstGeom prst="straightConnector1">
             <a:avLst/>
@@ -4966,8 +5035,8 @@
           <p:nvPr/>
         </p:nvSpPr>
         <p:spPr>
-          <a:xfrm rot="19926012">
-            <a:off x="4423792" y="1266896"/>
+          <a:xfrm rot="2621593">
+            <a:off x="5036485" y="1315423"/>
             <a:ext cx="1138389" cy="369332"/>
           </a:xfrm>
           <a:prstGeom prst="rect">
@@ -4997,7 +5066,7 @@
         </p:nvSpPr>
         <p:spPr>
           <a:xfrm>
-            <a:off x="6477018" y="469688"/>
+            <a:off x="5513457" y="322205"/>
             <a:ext cx="1663787" cy="470452"/>
           </a:xfrm>
           <a:prstGeom prst="wedgeRoundRectCallout">

</xml_diff>